<commit_message>
updated slides to match RTM SDK & REST APIs
</commit_message>
<xml_diff>
--- a/O3653-3 Deep Dive into Office 365 APIs for OneDrive for Business/O3653-3 Deep Dive into Office 365 APIs for OneDrive for Business.pptx
+++ b/O3653-3 Deep Dive into Office 365 APIs for OneDrive for Business/O3653-3 Deep Dive into Office 365 APIs for OneDrive for Business.pptx
@@ -343,7 +343,7 @@
           <a:p>
             <a:fld id="{DE219B1A-AE41-483B-A766-69B9363DDA6A}" type="datetimeFigureOut">
               <a:rPr lang="en-US" smtClean="0"/>
-              <a:t>10/5/2014</a:t>
+              <a:t>11/15/2014</a:t>
             </a:fld>
             <a:endParaRPr lang="en-US"/>
           </a:p>
@@ -625,7 +625,7 @@
           <a:p>
             <a:fld id="{D51B1278-D92B-4AF3-A9C1-71DD298190CE}" type="datetimeFigureOut">
               <a:rPr lang="en-US" smtClean="0"/>
-              <a:t>10/5/2014</a:t>
+              <a:t>11/15/2014</a:t>
             </a:fld>
             <a:endParaRPr lang="en-US"/>
           </a:p>
@@ -1243,7 +1243,7 @@
                 </a:solidFill>
               </a:rPr>
               <a:pPr/>
-              <a:t>10/5/2014</a:t>
+              <a:t>11/15/2014</a:t>
             </a:fld>
             <a:endParaRPr lang="en-US" dirty="0">
               <a:solidFill>
@@ -1426,7 +1426,7 @@
           <a:p>
             <a:fld id="{9F6C2A45-62A9-453C-B1A0-E9BD4232256A}" type="datetime1">
               <a:rPr lang="en-US" smtClean="0"/>
-              <a:t>10/5/2014</a:t>
+              <a:t>11/15/2014</a:t>
             </a:fld>
             <a:endParaRPr lang="en-US"/>
           </a:p>
@@ -1655,7 +1655,7 @@
           <a:p>
             <a:fld id="{4A523DA0-D7F9-40C8-93F2-955D0B90721A}" type="datetime1">
               <a:rPr lang="en-US" smtClean="0"/>
-              <a:t>10/5/2014</a:t>
+              <a:t>11/15/2014</a:t>
             </a:fld>
             <a:endParaRPr lang="en-US"/>
           </a:p>
@@ -1888,7 +1888,7 @@
           <a:p>
             <a:fld id="{1CC0E6A2-9C05-4C6A-B248-617B7C1A9EAE}" type="datetime1">
               <a:rPr lang="en-US" smtClean="0"/>
-              <a:t>10/5/2014</a:t>
+              <a:t>11/15/2014</a:t>
             </a:fld>
             <a:endParaRPr lang="en-US"/>
           </a:p>
@@ -2148,7 +2148,7 @@
           <a:p>
             <a:fld id="{B079C3B8-7366-4A44-A34B-3977080C19E7}" type="datetime1">
               <a:rPr lang="en-US" smtClean="0"/>
-              <a:t>10/5/2014</a:t>
+              <a:t>11/15/2014</a:t>
             </a:fld>
             <a:endParaRPr lang="en-US" dirty="0"/>
           </a:p>
@@ -2289,7 +2289,7 @@
                 </a:solidFill>
               </a:rPr>
               <a:pPr/>
-              <a:t>10/5/2014</a:t>
+              <a:t>11/15/2014</a:t>
             </a:fld>
             <a:endParaRPr lang="en-US" dirty="0">
               <a:solidFill>
@@ -2485,7 +2485,7 @@
           <a:p>
             <a:fld id="{E74353ED-ACB2-44BF-A903-985B0AF962B7}" type="datetime1">
               <a:rPr lang="en-US" smtClean="0"/>
-              <a:t>10/5/2014</a:t>
+              <a:t>11/15/2014</a:t>
             </a:fld>
             <a:endParaRPr lang="en-US" dirty="0"/>
           </a:p>
@@ -2704,7 +2704,7 @@
           <a:p>
             <a:fld id="{0BB6559B-C68D-49B4-97AE-9BB74C417927}" type="datetime1">
               <a:rPr lang="en-US" smtClean="0"/>
-              <a:t>10/5/2014</a:t>
+              <a:t>11/15/2014</a:t>
             </a:fld>
             <a:endParaRPr lang="en-US"/>
           </a:p>
@@ -2865,7 +2865,7 @@
           <a:p>
             <a:fld id="{B079C3B8-7366-4A44-A34B-3977080C19E7}" type="datetime1">
               <a:rPr lang="en-US" smtClean="0"/>
-              <a:t>10/5/2014</a:t>
+              <a:t>11/15/2014</a:t>
             </a:fld>
             <a:endParaRPr lang="en-US" dirty="0"/>
           </a:p>
@@ -3034,7 +3034,7 @@
           <a:p>
             <a:fld id="{EF0BC8FF-1410-4CCA-B01C-BFED761700B3}" type="datetime1">
               <a:rPr lang="en-US" smtClean="0"/>
-              <a:t>10/5/2014</a:t>
+              <a:t>11/15/2014</a:t>
             </a:fld>
             <a:endParaRPr lang="en-US"/>
           </a:p>
@@ -3271,7 +3271,7 @@
           <a:p>
             <a:fld id="{ADC4CC81-B90F-4AD9-813B-0B6C2BAB785E}" type="datetime1">
               <a:rPr lang="en-US" smtClean="0"/>
-              <a:t>10/5/2014</a:t>
+              <a:t>11/15/2014</a:t>
             </a:fld>
             <a:endParaRPr lang="en-US"/>
           </a:p>
@@ -3540,7 +3540,7 @@
           <a:p>
             <a:fld id="{ECF38875-AA95-4108-85FB-972DEC840C1C}" type="datetime1">
               <a:rPr lang="en-US" smtClean="0"/>
-              <a:t>10/5/2014</a:t>
+              <a:t>11/15/2014</a:t>
             </a:fld>
             <a:endParaRPr lang="en-US"/>
           </a:p>
@@ -3764,7 +3764,7 @@
           <a:p>
             <a:fld id="{F4ED0980-F356-492E-AEE0-341D5AB7B1F8}" type="datetime1">
               <a:rPr lang="en-US" smtClean="0"/>
-              <a:t>10/5/2014</a:t>
+              <a:t>11/15/2014</a:t>
             </a:fld>
             <a:endParaRPr lang="en-US"/>
           </a:p>
@@ -3986,7 +3986,7 @@
           <a:p>
             <a:fld id="{23FDFFE0-9E47-4B8C-842E-FA426FE218C8}" type="datetime1">
               <a:rPr lang="en-US" smtClean="0"/>
-              <a:t>10/5/2014</a:t>
+              <a:t>11/15/2014</a:t>
             </a:fld>
             <a:endParaRPr lang="en-US"/>
           </a:p>
@@ -4228,7 +4228,7 @@
           <a:p>
             <a:fld id="{8DACB9AA-B03F-4672-BD3F-07034206D49E}" type="datetime1">
               <a:rPr lang="en-US" smtClean="0"/>
-              <a:t>10/5/2014</a:t>
+              <a:t>11/15/2014</a:t>
             </a:fld>
             <a:endParaRPr lang="en-US"/>
           </a:p>
@@ -4471,7 +4471,7 @@
                 </a:solidFill>
               </a:rPr>
               <a:pPr/>
-              <a:t>10/5/2014</a:t>
+              <a:t>11/15/2014</a:t>
             </a:fld>
             <a:endParaRPr lang="en-US" dirty="0">
               <a:solidFill>
@@ -15085,28 +15085,22 @@
       </p:sp>
       <p:pic>
         <p:nvPicPr>
-          <p:cNvPr id="6" name="Picture 5"/>
+          <p:cNvPr id="5" name="Picture 4"/>
           <p:cNvPicPr>
             <a:picLocks noChangeAspect="1"/>
           </p:cNvPicPr>
           <p:nvPr/>
         </p:nvPicPr>
         <p:blipFill>
-          <a:blip r:embed="rId3">
-            <a:extLst>
-              <a:ext uri="{28A0092B-C50C-407E-A947-70E740481C1C}">
-                <a14:useLocalDpi xmlns:a14="http://schemas.microsoft.com/office/drawing/2010/main" val="0"/>
-              </a:ext>
-            </a:extLst>
-          </a:blip>
+          <a:blip r:embed="rId3"/>
           <a:stretch>
             <a:fillRect/>
           </a:stretch>
         </p:blipFill>
         <p:spPr>
           <a:xfrm>
-            <a:off x="1418926" y="2951116"/>
-            <a:ext cx="7825111" cy="2716154"/>
+            <a:off x="1861079" y="3166428"/>
+            <a:ext cx="8466667" cy="3342857"/>
           </a:xfrm>
           <a:prstGeom prst="rect">
             <a:avLst/>
@@ -15174,13 +15168,8 @@
           <a:p>
             <a:r>
               <a:rPr lang="en-US" dirty="0" smtClean="0"/>
-              <a:t>Can also read an individual </a:t>
-            </a:r>
-            <a:r>
-              <a:rPr lang="en-US" dirty="0" smtClean="0"/>
-              <a:t>Folder</a:t>
-            </a:r>
-            <a:endParaRPr lang="en-US" dirty="0" smtClean="0"/>
+              <a:t>Can also read an individual Folder</a:t>
+            </a:r>
           </a:p>
         </p:txBody>
       </p:sp>
@@ -15285,12 +15274,21 @@
             </a:r>
             <a:r>
               <a:rPr lang="en-US" dirty="0" err="1" smtClean="0"/>
-              <a:t>AddAsync</a:t>
+              <a:t>AddItemAsync</a:t>
             </a:r>
             <a:r>
               <a:rPr lang="en-US" dirty="0" smtClean="0"/>
-              <a:t> method</a:t>
-            </a:r>
+              <a:t>() &amp; </a:t>
+            </a:r>
+            <a:r>
+              <a:rPr lang="en-US" dirty="0" err="1" smtClean="0"/>
+              <a:t>UploadAsync</a:t>
+            </a:r>
+            <a:r>
+              <a:rPr lang="en-US" dirty="0" smtClean="0"/>
+              <a:t>() methods</a:t>
+            </a:r>
+            <a:endParaRPr lang="en-US" dirty="0" smtClean="0"/>
           </a:p>
           <a:p>
             <a:r>
@@ -15350,28 +15348,22 @@
       </p:sp>
       <p:pic>
         <p:nvPicPr>
-          <p:cNvPr id="6" name="Picture 5"/>
+          <p:cNvPr id="7" name="Picture 6"/>
           <p:cNvPicPr>
             <a:picLocks noChangeAspect="1"/>
           </p:cNvPicPr>
           <p:nvPr/>
         </p:nvPicPr>
         <p:blipFill>
-          <a:blip r:embed="rId2">
-            <a:extLst>
-              <a:ext uri="{28A0092B-C50C-407E-A947-70E740481C1C}">
-                <a14:useLocalDpi xmlns:a14="http://schemas.microsoft.com/office/drawing/2010/main" val="0"/>
-              </a:ext>
-            </a:extLst>
-          </a:blip>
+          <a:blip r:embed="rId2"/>
           <a:stretch>
             <a:fillRect/>
           </a:stretch>
         </p:blipFill>
         <p:spPr>
           <a:xfrm>
-            <a:off x="721683" y="3547219"/>
-            <a:ext cx="8244332" cy="695616"/>
+            <a:off x="1753068" y="3038076"/>
+            <a:ext cx="8682689" cy="2773178"/>
           </a:xfrm>
           <a:prstGeom prst="rect">
             <a:avLst/>
@@ -15432,12 +15424,21 @@
             </a:r>
             <a:r>
               <a:rPr lang="en-US" dirty="0" err="1" smtClean="0"/>
-              <a:t>GetByAsync</a:t>
+              <a:t>GetById</a:t>
             </a:r>
             <a:r>
               <a:rPr lang="en-US" dirty="0" smtClean="0"/>
-              <a:t> method</a:t>
-            </a:r>
+              <a:t>() &amp; </a:t>
+            </a:r>
+            <a:r>
+              <a:rPr lang="en-US" dirty="0" err="1" smtClean="0"/>
+              <a:t>ExecuteAsync</a:t>
+            </a:r>
+            <a:r>
+              <a:rPr lang="en-US" dirty="0" smtClean="0"/>
+              <a:t>() methods</a:t>
+            </a:r>
+            <a:endParaRPr lang="en-US" dirty="0" smtClean="0"/>
           </a:p>
           <a:p>
             <a:r>
@@ -15450,7 +15451,11 @@
             </a:r>
             <a:r>
               <a:rPr lang="en-US" dirty="0" smtClean="0"/>
-              <a:t> method</a:t>
+              <a:t>() </a:t>
+            </a:r>
+            <a:r>
+              <a:rPr lang="en-US" dirty="0" smtClean="0"/>
+              <a:t>method</a:t>
             </a:r>
             <a:endParaRPr lang="en-US" dirty="0"/>
           </a:p>
@@ -15505,28 +15510,22 @@
       </p:sp>
       <p:pic>
         <p:nvPicPr>
-          <p:cNvPr id="5" name="Picture 4"/>
+          <p:cNvPr id="6" name="Picture 5"/>
           <p:cNvPicPr>
             <a:picLocks noChangeAspect="1"/>
           </p:cNvPicPr>
           <p:nvPr/>
         </p:nvPicPr>
         <p:blipFill>
-          <a:blip r:embed="rId2">
-            <a:extLst>
-              <a:ext uri="{28A0092B-C50C-407E-A947-70E740481C1C}">
-                <a14:useLocalDpi xmlns:a14="http://schemas.microsoft.com/office/drawing/2010/main" val="0"/>
-              </a:ext>
-            </a:extLst>
-          </a:blip>
+          <a:blip r:embed="rId2"/>
           <a:stretch>
             <a:fillRect/>
           </a:stretch>
         </p:blipFill>
         <p:spPr>
           <a:xfrm>
-            <a:off x="801043" y="4032471"/>
-            <a:ext cx="7372862" cy="770642"/>
+            <a:off x="1645891" y="3717827"/>
+            <a:ext cx="8897042" cy="1636238"/>
           </a:xfrm>
           <a:prstGeom prst="rect">
             <a:avLst/>
@@ -15793,8 +15792,13 @@
           <a:p>
             <a:r>
               <a:rPr lang="en-US" sz="2352" dirty="0"/>
-              <a:t>GET http://&lt;onedrive&gt;/_api/Files</a:t>
-            </a:r>
+              <a:t>GET http://&lt;onedrive&gt;/_</a:t>
+            </a:r>
+            <a:r>
+              <a:rPr lang="en-US" sz="2352" dirty="0" smtClean="0"/>
+              <a:t>api/v1.0/files</a:t>
+            </a:r>
+            <a:endParaRPr lang="en-US" sz="2352" dirty="0"/>
           </a:p>
           <a:p>
             <a:endParaRPr lang="en-US" sz="1960" dirty="0"/>
@@ -15808,7 +15812,15 @@
           <a:p>
             <a:r>
               <a:rPr lang="en-US" sz="2352" dirty="0"/>
-              <a:t>GET http://&lt;onedrive&gt;/_api/Files('folder')</a:t>
+              <a:t>GET http://&lt;onedrive&gt;/_</a:t>
+            </a:r>
+            <a:r>
+              <a:rPr lang="en-US" sz="2352" dirty="0" smtClean="0"/>
+              <a:t>api/v1.0/getByPath(</a:t>
+            </a:r>
+            <a:r>
+              <a:rPr lang="en-US" sz="2352" dirty="0"/>
+              <a:t>'folder')</a:t>
             </a:r>
           </a:p>
           <a:p>
@@ -15823,7 +15835,15 @@
           <a:p>
             <a:r>
               <a:rPr lang="en-US" sz="2352" dirty="0"/>
-              <a:t>GET http://&lt;onedrive&gt;/_api/Files('folder')/Children</a:t>
+              <a:t>GET http://&lt;onedrive&gt;/_</a:t>
+            </a:r>
+            <a:r>
+              <a:rPr lang="en-US" sz="2352" dirty="0" smtClean="0"/>
+              <a:t>api/v1.0/getByPath(</a:t>
+            </a:r>
+            <a:r>
+              <a:rPr lang="en-US" sz="2352" dirty="0"/>
+              <a:t>'folder')/Children</a:t>
             </a:r>
           </a:p>
           <a:p>
@@ -15838,7 +15858,23 @@
           <a:p>
             <a:r>
               <a:rPr lang="en-US" sz="2352" dirty="0"/>
-              <a:t>GET http://&lt;onedrive&gt;/_api/Files('folder/filename.docx')</a:t>
+              <a:t>GET http://&lt;onedrive&gt;/_</a:t>
+            </a:r>
+            <a:r>
+              <a:rPr lang="en-US" sz="2352" dirty="0" smtClean="0"/>
+              <a:t>api/v1.0/files</a:t>
+            </a:r>
+            <a:r>
+              <a:rPr lang="en-US" sz="2352" dirty="0"/>
+              <a:t>(</a:t>
+            </a:r>
+            <a:r>
+              <a:rPr lang="en-US" sz="2352" dirty="0" smtClean="0"/>
+              <a:t>'filename.docx</a:t>
+            </a:r>
+            <a:r>
+              <a:rPr lang="en-US" sz="2352" dirty="0"/>
+              <a:t>')</a:t>
             </a:r>
           </a:p>
           <a:p>
@@ -15853,8 +15889,17 @@
           <a:p>
             <a:r>
               <a:rPr lang="en-US" sz="2352" dirty="0"/>
-              <a:t>GET http://&lt;onedrive&gt;/_api/Files('folder/filename.docx')/download</a:t>
-            </a:r>
+              <a:t>GET http://&lt;onedrive&gt;/_</a:t>
+            </a:r>
+            <a:r>
+              <a:rPr lang="en-US" sz="2352" dirty="0" smtClean="0"/>
+              <a:t>api/v1.0/files('filename.docx')/</a:t>
+            </a:r>
+            <a:r>
+              <a:rPr lang="en-US" sz="2352" dirty="0" smtClean="0"/>
+              <a:t>content</a:t>
+            </a:r>
+            <a:endParaRPr lang="en-US" sz="2352" dirty="0"/>
           </a:p>
           <a:p>
             <a:endParaRPr lang="en-US" sz="2352" dirty="0"/>
@@ -15961,24 +16006,33 @@
           <a:p>
             <a:r>
               <a:rPr lang="en-US" sz="2352" dirty="0"/>
-              <a:t>POST /_api/Files/Add(name='folder/filename.</a:t>
-            </a:r>
-            <a:r>
-              <a:rPr lang="en-US" sz="2352" dirty="0" err="1"/>
-              <a:t>docx</a:t>
+              <a:t>POST /_</a:t>
+            </a:r>
+            <a:r>
+              <a:rPr lang="en-US" sz="2352" dirty="0" err="1" smtClean="0"/>
+              <a:t>api</a:t>
+            </a:r>
+            <a:r>
+              <a:rPr lang="en-US" sz="2352" dirty="0" smtClean="0"/>
+              <a:t>/v1.0/files/('folder')/</a:t>
             </a:r>
             <a:r>
               <a:rPr lang="en-US" sz="2352" dirty="0"/>
-              <a:t>',overwrite=&lt;</a:t>
-            </a:r>
-            <a:r>
-              <a:rPr lang="en-US" sz="2352" dirty="0" err="1"/>
-              <a:t>bool</a:t>
+              <a:t>children</a:t>
+            </a:r>
+            <a:r>
+              <a:rPr lang="en-US" sz="2352" dirty="0" smtClean="0"/>
+              <a:t>/(</a:t>
             </a:r>
             <a:r>
               <a:rPr lang="en-US" sz="2352" dirty="0"/>
-              <a:t>&gt;)</a:t>
-            </a:r>
+              <a:t>'</a:t>
+            </a:r>
+            <a:r>
+              <a:rPr lang="en-US" sz="2352" dirty="0" smtClean="0"/>
+              <a:t>file.txt')/content</a:t>
+            </a:r>
+            <a:endParaRPr lang="en-US" sz="2352" dirty="0"/>
           </a:p>
           <a:p>
             <a:endParaRPr lang="en-US" sz="1960" dirty="0"/>
@@ -15992,7 +16046,19 @@
           <a:p>
             <a:r>
               <a:rPr lang="en-US" sz="2352" dirty="0"/>
-              <a:t>DELETE /_api/Files('folder/filename.docx')</a:t>
+              <a:t>DELETE /_</a:t>
+            </a:r>
+            <a:r>
+              <a:rPr lang="en-US" sz="2352" dirty="0" err="1" smtClean="0"/>
+              <a:t>api</a:t>
+            </a:r>
+            <a:r>
+              <a:rPr lang="en-US" sz="2352" dirty="0" smtClean="0"/>
+              <a:t>/v1.0/files</a:t>
+            </a:r>
+            <a:r>
+              <a:rPr lang="en-US" sz="2352" dirty="0"/>
+              <a:t>('folder/filename.docx')</a:t>
             </a:r>
           </a:p>
           <a:p>
@@ -16001,7 +16067,7 @@
           <a:p>
             <a:r>
               <a:rPr lang="en-US" sz="2352" dirty="0"/>
-              <a:t>Get metadata for a folder and its children</a:t>
+              <a:t>Get on selected metadata fields back for first 5 files in OneDrive</a:t>
             </a:r>
           </a:p>
           <a:p>
@@ -16010,27 +16076,16 @@
               <a:t>GET /_</a:t>
             </a:r>
             <a:r>
-              <a:rPr lang="en-US" sz="2352" dirty="0" err="1"/>
+              <a:rPr lang="en-US" sz="2352" dirty="0" err="1" smtClean="0"/>
               <a:t>api</a:t>
             </a:r>
             <a:r>
+              <a:rPr lang="en-US" sz="2352" dirty="0" smtClean="0"/>
+              <a:t>/v1.0/files/?$</a:t>
+            </a:r>
+            <a:r>
               <a:rPr lang="en-US" sz="2352" dirty="0"/>
-              <a:t>/Files('folder')?$expand=Children</a:t>
-            </a:r>
-          </a:p>
-          <a:p>
-            <a:endParaRPr lang="en-US" sz="1960" dirty="0"/>
-          </a:p>
-          <a:p>
-            <a:r>
-              <a:rPr lang="en-US" sz="2352" dirty="0"/>
-              <a:t>Get on selected metadata fields back for first 5 files in OneDrive</a:t>
-            </a:r>
-          </a:p>
-          <a:p>
-            <a:r>
-              <a:rPr lang="en-US" sz="2352" dirty="0"/>
-              <a:t>GET /_api/Files?$select=</a:t>
+              <a:t>select=</a:t>
             </a:r>
             <a:r>
               <a:rPr lang="en-US" sz="2352" dirty="0" err="1"/>
@@ -17299,7 +17354,7 @@
                 <a:gridCol w="5760278">
                   <a:extLst>
                     <a:ext uri="{9D8B030D-6E8A-4147-A177-3AD203B41FA5}">
-                      <a16:colId xmlns:a16="http://schemas.microsoft.com/office/drawing/2014/main" xmlns="" val="1253488153"/>
+                      <a16:colId xmlns="" xmlns:a16="http://schemas.microsoft.com/office/drawing/2014/main" val="1253488153"/>
                     </a:ext>
                   </a:extLst>
                 </a:gridCol>
@@ -17325,7 +17380,7 @@
                 </a:tc>
                 <a:extLst>
                   <a:ext uri="{0D108BD9-81ED-4DB2-BD59-A6C34878D82A}">
-                    <a16:rowId xmlns:a16="http://schemas.microsoft.com/office/drawing/2014/main" xmlns="" val="829859176"/>
+                    <a16:rowId xmlns="" xmlns:a16="http://schemas.microsoft.com/office/drawing/2014/main" val="829859176"/>
                   </a:ext>
                 </a:extLst>
               </a:tr>
@@ -17350,7 +17405,7 @@
                 </a:tc>
                 <a:extLst>
                   <a:ext uri="{0D108BD9-81ED-4DB2-BD59-A6C34878D82A}">
-                    <a16:rowId xmlns:a16="http://schemas.microsoft.com/office/drawing/2014/main" xmlns="" val="1946132611"/>
+                    <a16:rowId xmlns="" xmlns:a16="http://schemas.microsoft.com/office/drawing/2014/main" val="1946132611"/>
                   </a:ext>
                 </a:extLst>
               </a:tr>
@@ -17392,7 +17447,7 @@
                 </a:tc>
                 <a:extLst>
                   <a:ext uri="{0D108BD9-81ED-4DB2-BD59-A6C34878D82A}">
-                    <a16:rowId xmlns:a16="http://schemas.microsoft.com/office/drawing/2014/main" xmlns="" val="3204002662"/>
+                    <a16:rowId xmlns="" xmlns:a16="http://schemas.microsoft.com/office/drawing/2014/main" val="3204002662"/>
                   </a:ext>
                 </a:extLst>
               </a:tr>
@@ -17429,7 +17484,7 @@
                 </a:tc>
                 <a:extLst>
                   <a:ext uri="{0D108BD9-81ED-4DB2-BD59-A6C34878D82A}">
-                    <a16:rowId xmlns:a16="http://schemas.microsoft.com/office/drawing/2014/main" xmlns="" val="3774542436"/>
+                    <a16:rowId xmlns="" xmlns:a16="http://schemas.microsoft.com/office/drawing/2014/main" val="3774542436"/>
                   </a:ext>
                 </a:extLst>
               </a:tr>
@@ -17481,7 +17536,7 @@
                 </a:tc>
                 <a:extLst>
                   <a:ext uri="{0D108BD9-81ED-4DB2-BD59-A6C34878D82A}">
-                    <a16:rowId xmlns:a16="http://schemas.microsoft.com/office/drawing/2014/main" xmlns="" val="4266278162"/>
+                    <a16:rowId xmlns="" xmlns:a16="http://schemas.microsoft.com/office/drawing/2014/main" val="4266278162"/>
                   </a:ext>
                 </a:extLst>
               </a:tr>
@@ -17518,7 +17573,7 @@
                 </a:tc>
                 <a:extLst>
                   <a:ext uri="{0D108BD9-81ED-4DB2-BD59-A6C34878D82A}">
-                    <a16:rowId xmlns:a16="http://schemas.microsoft.com/office/drawing/2014/main" xmlns="" val="1208832343"/>
+                    <a16:rowId xmlns="" xmlns:a16="http://schemas.microsoft.com/office/drawing/2014/main" val="1208832343"/>
                   </a:ext>
                 </a:extLst>
               </a:tr>
@@ -18161,28 +18216,22 @@
       </p:sp>
       <p:pic>
         <p:nvPicPr>
-          <p:cNvPr id="6" name="Picture 5"/>
+          <p:cNvPr id="5" name="Picture 4"/>
           <p:cNvPicPr>
             <a:picLocks noChangeAspect="1"/>
           </p:cNvPicPr>
           <p:nvPr/>
         </p:nvPicPr>
         <p:blipFill>
-          <a:blip r:embed="rId3">
-            <a:extLst>
-              <a:ext uri="{28A0092B-C50C-407E-A947-70E740481C1C}">
-                <a14:useLocalDpi xmlns:a14="http://schemas.microsoft.com/office/drawing/2010/main" val="0"/>
-              </a:ext>
-            </a:extLst>
-          </a:blip>
+          <a:blip r:embed="rId3"/>
           <a:stretch>
             <a:fillRect/>
           </a:stretch>
         </p:blipFill>
         <p:spPr>
           <a:xfrm>
-            <a:off x="915657" y="3130267"/>
-            <a:ext cx="9214840" cy="2707825"/>
+            <a:off x="1581578" y="3014505"/>
+            <a:ext cx="9025668" cy="2953158"/>
           </a:xfrm>
           <a:prstGeom prst="rect">
             <a:avLst/>
@@ -18300,28 +18349,22 @@
       </p:sp>
       <p:pic>
         <p:nvPicPr>
-          <p:cNvPr id="5" name="Picture 4"/>
+          <p:cNvPr id="6" name="Picture 5"/>
           <p:cNvPicPr>
             <a:picLocks noChangeAspect="1"/>
           </p:cNvPicPr>
           <p:nvPr/>
         </p:nvPicPr>
         <p:blipFill>
-          <a:blip r:embed="rId3">
-            <a:extLst>
-              <a:ext uri="{28A0092B-C50C-407E-A947-70E740481C1C}">
-                <a14:useLocalDpi xmlns:a14="http://schemas.microsoft.com/office/drawing/2010/main" val="0"/>
-              </a:ext>
-            </a:extLst>
-          </a:blip>
+          <a:blip r:embed="rId3"/>
           <a:stretch>
             <a:fillRect/>
           </a:stretch>
         </p:blipFill>
         <p:spPr>
           <a:xfrm>
-            <a:off x="950758" y="2977179"/>
-            <a:ext cx="8965228" cy="3122170"/>
+            <a:off x="1645459" y="3151656"/>
+            <a:ext cx="8897907" cy="2864133"/>
           </a:xfrm>
           <a:prstGeom prst="rect">
             <a:avLst/>
@@ -18437,28 +18480,22 @@
       </p:sp>
       <p:pic>
         <p:nvPicPr>
-          <p:cNvPr id="6" name="Picture 5"/>
+          <p:cNvPr id="5" name="Picture 4"/>
           <p:cNvPicPr>
             <a:picLocks noChangeAspect="1"/>
           </p:cNvPicPr>
           <p:nvPr/>
         </p:nvPicPr>
         <p:blipFill>
-          <a:blip r:embed="rId3">
-            <a:extLst>
-              <a:ext uri="{28A0092B-C50C-407E-A947-70E740481C1C}">
-                <a14:useLocalDpi xmlns:a14="http://schemas.microsoft.com/office/drawing/2010/main" val="0"/>
-              </a:ext>
-            </a:extLst>
-          </a:blip>
+          <a:blip r:embed="rId3"/>
           <a:stretch>
             <a:fillRect/>
           </a:stretch>
         </p:blipFill>
         <p:spPr>
           <a:xfrm>
-            <a:off x="1081386" y="2536260"/>
-            <a:ext cx="10067144" cy="2719028"/>
+            <a:off x="750491" y="2428999"/>
+            <a:ext cx="10687842" cy="3201779"/>
           </a:xfrm>
           <a:prstGeom prst="rect">
             <a:avLst/>
@@ -29860,7 +29897,7 @@
                 <a:gridCol w="11225057">
                   <a:extLst>
                     <a:ext uri="{9D8B030D-6E8A-4147-A177-3AD203B41FA5}">
-                      <a16:colId xmlns:a16="http://schemas.microsoft.com/office/drawing/2014/main" xmlns="" val="1253488153"/>
+                      <a16:colId xmlns="" xmlns:a16="http://schemas.microsoft.com/office/drawing/2014/main" val="1253488153"/>
                     </a:ext>
                   </a:extLst>
                 </a:gridCol>
@@ -29882,7 +29919,7 @@
                 </a:tc>
                 <a:extLst>
                   <a:ext uri="{0D108BD9-81ED-4DB2-BD59-A6C34878D82A}">
-                    <a16:rowId xmlns:a16="http://schemas.microsoft.com/office/drawing/2014/main" xmlns="" val="829859176"/>
+                    <a16:rowId xmlns="" xmlns:a16="http://schemas.microsoft.com/office/drawing/2014/main" val="829859176"/>
                   </a:ext>
                 </a:extLst>
               </a:tr>
@@ -29903,7 +29940,7 @@
                 </a:tc>
                 <a:extLst>
                   <a:ext uri="{0D108BD9-81ED-4DB2-BD59-A6C34878D82A}">
-                    <a16:rowId xmlns:a16="http://schemas.microsoft.com/office/drawing/2014/main" xmlns="" val="1946132611"/>
+                    <a16:rowId xmlns="" xmlns:a16="http://schemas.microsoft.com/office/drawing/2014/main" val="1946132611"/>
                   </a:ext>
                 </a:extLst>
               </a:tr>
@@ -29945,7 +29982,7 @@
                 </a:tc>
                 <a:extLst>
                   <a:ext uri="{0D108BD9-81ED-4DB2-BD59-A6C34878D82A}">
-                    <a16:rowId xmlns:a16="http://schemas.microsoft.com/office/drawing/2014/main" xmlns="" val="3204002662"/>
+                    <a16:rowId xmlns="" xmlns:a16="http://schemas.microsoft.com/office/drawing/2014/main" val="3204002662"/>
                   </a:ext>
                 </a:extLst>
               </a:tr>
@@ -29982,7 +30019,7 @@
                 </a:tc>
                 <a:extLst>
                   <a:ext uri="{0D108BD9-81ED-4DB2-BD59-A6C34878D82A}">
-                    <a16:rowId xmlns:a16="http://schemas.microsoft.com/office/drawing/2014/main" xmlns="" val="4266278162"/>
+                    <a16:rowId xmlns="" xmlns:a16="http://schemas.microsoft.com/office/drawing/2014/main" val="4266278162"/>
                   </a:ext>
                 </a:extLst>
               </a:tr>
@@ -30020,7 +30057,7 @@
                 </a:tc>
                 <a:extLst>
                   <a:ext uri="{0D108BD9-81ED-4DB2-BD59-A6C34878D82A}">
-                    <a16:rowId xmlns:a16="http://schemas.microsoft.com/office/drawing/2014/main" xmlns="" val="2405060554"/>
+                    <a16:rowId xmlns="" xmlns:a16="http://schemas.microsoft.com/office/drawing/2014/main" val="2405060554"/>
                   </a:ext>
                 </a:extLst>
               </a:tr>
@@ -30065,7 +30102,7 @@
                 </a:tc>
                 <a:extLst>
                   <a:ext uri="{0D108BD9-81ED-4DB2-BD59-A6C34878D82A}">
-                    <a16:rowId xmlns:a16="http://schemas.microsoft.com/office/drawing/2014/main" xmlns="" val="3069023435"/>
+                    <a16:rowId xmlns="" xmlns:a16="http://schemas.microsoft.com/office/drawing/2014/main" val="3069023435"/>
                   </a:ext>
                 </a:extLst>
               </a:tr>
@@ -30102,7 +30139,7 @@
                 </a:tc>
                 <a:extLst>
                   <a:ext uri="{0D108BD9-81ED-4DB2-BD59-A6C34878D82A}">
-                    <a16:rowId xmlns:a16="http://schemas.microsoft.com/office/drawing/2014/main" xmlns="" val="2293274207"/>
+                    <a16:rowId xmlns="" xmlns:a16="http://schemas.microsoft.com/office/drawing/2014/main" val="2293274207"/>
                   </a:ext>
                 </a:extLst>
               </a:tr>
@@ -30139,7 +30176,7 @@
                 </a:tc>
                 <a:extLst>
                   <a:ext uri="{0D108BD9-81ED-4DB2-BD59-A6C34878D82A}">
-                    <a16:rowId xmlns:a16="http://schemas.microsoft.com/office/drawing/2014/main" xmlns="" val="4198435309"/>
+                    <a16:rowId xmlns="" xmlns:a16="http://schemas.microsoft.com/office/drawing/2014/main" val="4198435309"/>
                   </a:ext>
                 </a:extLst>
               </a:tr>
@@ -32255,6 +32292,15 @@
 </file>
 
 <file path=customXml/item1.xml><?xml version="1.0" encoding="utf-8"?>
+<?mso-contentType ?>
+<FormTemplates xmlns="http://schemas.microsoft.com/sharepoint/v3/contenttype/forms">
+  <Display>DocumentLibraryForm</Display>
+  <Edit>DocumentLibraryForm</Edit>
+  <New>DocumentLibraryForm</New>
+</FormTemplates>
+</file>
+
+<file path=customXml/item2.xml><?xml version="1.0" encoding="utf-8"?>
 <ct:contentTypeSchema xmlns:ct="http://schemas.microsoft.com/office/2006/metadata/contentType" xmlns:ma="http://schemas.microsoft.com/office/2006/metadata/properties/metaAttributes" ct:_="" ma:_="" ma:contentTypeName="Document" ma:contentTypeID="0x010100A2E4C90AA7333249A7DBC8CC6F49919B" ma:contentTypeVersion="1" ma:contentTypeDescription="Create a new document." ma:contentTypeScope="" ma:versionID="e7b09f0f38d7ed30c7da14951e97abcc">
   <xsd:schema xmlns:xsd="http://www.w3.org/2001/XMLSchema" xmlns:xs="http://www.w3.org/2001/XMLSchema" xmlns:p="http://schemas.microsoft.com/office/2006/metadata/properties" xmlns:ns2="5fad15d0-477e-40da-a20d-40d4ca777cbd" targetNamespace="http://schemas.microsoft.com/office/2006/metadata/properties" ma:root="true" ma:fieldsID="0cee24db179c30c5ebec40b677cadf70" ns2:_="">
     <xsd:import namespace="5fad15d0-477e-40da-a20d-40d4ca777cbd"/>
@@ -32394,15 +32440,6 @@
 </ct:contentTypeSchema>
 </file>
 
-<file path=customXml/item2.xml><?xml version="1.0" encoding="utf-8"?>
-<?mso-contentType ?>
-<FormTemplates xmlns="http://schemas.microsoft.com/sharepoint/v3/contenttype/forms">
-  <Display>DocumentLibraryForm</Display>
-  <Edit>DocumentLibraryForm</Edit>
-  <New>DocumentLibraryForm</New>
-</FormTemplates>
-</file>
-
 <file path=customXml/item3.xml><?xml version="1.0" encoding="utf-8"?>
 <p:properties xmlns:p="http://schemas.microsoft.com/office/2006/metadata/properties" xmlns:xsi="http://www.w3.org/2001/XMLSchema-instance" xmlns:pc="http://schemas.microsoft.com/office/infopath/2007/PartnerControls">
   <documentManagement/>
@@ -32410,6 +32447,14 @@
 </file>
 
 <file path=customXml/itemProps1.xml><?xml version="1.0" encoding="utf-8"?>
+<ds:datastoreItem xmlns:ds="http://schemas.openxmlformats.org/officeDocument/2006/customXml" ds:itemID="{E1E0CE18-CA03-4891-9CD8-3448778E3D53}">
+  <ds:schemaRefs>
+    <ds:schemaRef ds:uri="http://schemas.microsoft.com/sharepoint/v3/contenttype/forms"/>
+  </ds:schemaRefs>
+</ds:datastoreItem>
+</file>
+
+<file path=customXml/itemProps2.xml><?xml version="1.0" encoding="utf-8"?>
 <ds:datastoreItem xmlns:ds="http://schemas.openxmlformats.org/officeDocument/2006/customXml" ds:itemID="{F17DCE38-6787-497B-B958-75817420EB1E}">
   <ds:schemaRefs>
     <ds:schemaRef ds:uri="http://schemas.microsoft.com/office/2006/metadata/contentType"/>
@@ -32423,14 +32468,6 @@
     <ds:schemaRef ds:uri="http://purl.org/dc/elements/1.1/"/>
     <ds:schemaRef ds:uri="http://purl.org/dc/terms/"/>
     <ds:schemaRef ds:uri="http://schemas.microsoft.com/internal/obd"/>
-  </ds:schemaRefs>
-</ds:datastoreItem>
-</file>
-
-<file path=customXml/itemProps2.xml><?xml version="1.0" encoding="utf-8"?>
-<ds:datastoreItem xmlns:ds="http://schemas.openxmlformats.org/officeDocument/2006/customXml" ds:itemID="{E1E0CE18-CA03-4891-9CD8-3448778E3D53}">
-  <ds:schemaRefs>
-    <ds:schemaRef ds:uri="http://schemas.microsoft.com/sharepoint/v3/contenttype/forms"/>
   </ds:schemaRefs>
 </ds:datastoreItem>
 </file>

</xml_diff>